<commit_message>
finalização de documento de arquitetura
</commit_message>
<xml_diff>
--- a/Sistema/001-Análise e Projeto/ARQ-Documento de Arquitetura.pptx
+++ b/Sistema/001-Análise e Projeto/ARQ-Documento de Arquitetura.pptx
@@ -16,8 +16,9 @@
     <p:sldId id="265" r:id="rId10"/>
     <p:sldId id="266" r:id="rId11"/>
     <p:sldId id="267" r:id="rId12"/>
-    <p:sldId id="268" r:id="rId13"/>
-    <p:sldId id="269" r:id="rId14"/>
+    <p:sldId id="270" r:id="rId13"/>
+    <p:sldId id="268" r:id="rId14"/>
+    <p:sldId id="269" r:id="rId15"/>
   </p:sldIdLst>
   <p:sldSz cx="9144000" cy="6858000" type="screen4x3"/>
   <p:notesSz cx="7772400" cy="10058400"/>
@@ -2673,8 +2674,8 @@
         </p:nvSpPr>
         <p:spPr>
           <a:xfrm>
-            <a:off x="214006" y="206584"/>
-            <a:ext cx="8784077" cy="1141920"/>
+            <a:off x="457200" y="274680"/>
+            <a:ext cx="8228520" cy="1141920"/>
           </a:xfrm>
           <a:prstGeom prst="rect">
             <a:avLst/>
@@ -2718,8 +2719,35 @@
                 <a:latin typeface="Calibri"/>
                 <a:ea typeface="DejaVu Sans"/>
               </a:rPr>
-              <a:t>Visão de Componentes de conectores</a:t>
-            </a:r>
+              <a:t>Visão de Módulos – </a:t>
+            </a:r>
+            <a:r>
+              <a:rPr lang="pt-BR" sz="4400" b="0" strike="noStrike" spc="-1" dirty="0" err="1" smtClean="0">
+                <a:solidFill>
+                  <a:srgbClr val="000000"/>
+                </a:solidFill>
+                <a:uFill>
+                  <a:solidFill>
+                    <a:srgbClr val="FFFFFF"/>
+                  </a:solidFill>
+                </a:uFill>
+                <a:latin typeface="Calibri"/>
+                <a:ea typeface="DejaVu Sans"/>
+              </a:rPr>
+              <a:t>Android</a:t>
+            </a:r>
+            <a:endParaRPr lang="pt-BR" sz="4400" b="0" strike="noStrike" spc="-1" dirty="0" smtClean="0">
+              <a:solidFill>
+                <a:srgbClr val="000000"/>
+              </a:solidFill>
+              <a:uFill>
+                <a:solidFill>
+                  <a:srgbClr val="FFFFFF"/>
+                </a:solidFill>
+              </a:uFill>
+              <a:latin typeface="Calibri"/>
+              <a:ea typeface="DejaVu Sans"/>
+            </a:endParaRPr>
           </a:p>
         </p:txBody>
       </p:sp>
@@ -2780,10 +2808,40 @@
           </a:p>
         </p:txBody>
       </p:sp>
+      <p:pic>
+        <p:nvPicPr>
+          <p:cNvPr id="3" name="Imagem 2"/>
+          <p:cNvPicPr>
+            <a:picLocks noChangeAspect="1"/>
+          </p:cNvPicPr>
+          <p:nvPr/>
+        </p:nvPicPr>
+        <p:blipFill>
+          <a:blip r:embed="rId2">
+            <a:extLst>
+              <a:ext uri="{28A0092B-C50C-407E-A947-70E740481C1C}">
+                <a14:useLocalDpi xmlns:a14="http://schemas.microsoft.com/office/drawing/2010/main" val="0"/>
+              </a:ext>
+            </a:extLst>
+          </a:blip>
+          <a:stretch>
+            <a:fillRect/>
+          </a:stretch>
+        </p:blipFill>
+        <p:spPr>
+          <a:xfrm>
+            <a:off x="707480" y="1894663"/>
+            <a:ext cx="7727960" cy="3552825"/>
+          </a:xfrm>
+          <a:prstGeom prst="rect">
+            <a:avLst/>
+          </a:prstGeom>
+        </p:spPr>
+      </p:pic>
     </p:spTree>
     <p:extLst>
       <p:ext uri="{BB962C8B-B14F-4D97-AF65-F5344CB8AC3E}">
-        <p14:creationId xmlns:p14="http://schemas.microsoft.com/office/powerpoint/2010/main" val="895464465"/>
+        <p14:creationId xmlns:p14="http://schemas.microsoft.com/office/powerpoint/2010/main" val="2206804949"/>
       </p:ext>
     </p:extLst>
   </p:cSld>
@@ -2890,7 +2948,7 @@
                 <a:latin typeface="Calibri"/>
                 <a:ea typeface="DejaVu Sans"/>
               </a:rPr>
-              <a:t>Visão de Alocação</a:t>
+              <a:t>Visão de Componentes de conectores</a:t>
             </a:r>
           </a:p>
         </p:txBody>
@@ -2952,6 +3010,238 @@
           </a:p>
         </p:txBody>
       </p:sp>
+      <p:pic>
+        <p:nvPicPr>
+          <p:cNvPr id="3" name="Imagem 2"/>
+          <p:cNvPicPr>
+            <a:picLocks noChangeAspect="1"/>
+          </p:cNvPicPr>
+          <p:nvPr/>
+        </p:nvPicPr>
+        <p:blipFill>
+          <a:blip r:embed="rId2">
+            <a:extLst>
+              <a:ext uri="{28A0092B-C50C-407E-A947-70E740481C1C}">
+                <a14:useLocalDpi xmlns:a14="http://schemas.microsoft.com/office/drawing/2010/main" val="0"/>
+              </a:ext>
+            </a:extLst>
+          </a:blip>
+          <a:stretch>
+            <a:fillRect/>
+          </a:stretch>
+        </p:blipFill>
+        <p:spPr>
+          <a:xfrm>
+            <a:off x="0" y="1722309"/>
+            <a:ext cx="9144000" cy="3841399"/>
+          </a:xfrm>
+          <a:prstGeom prst="rect">
+            <a:avLst/>
+          </a:prstGeom>
+        </p:spPr>
+      </p:pic>
+    </p:spTree>
+    <p:extLst>
+      <p:ext uri="{BB962C8B-B14F-4D97-AF65-F5344CB8AC3E}">
+        <p14:creationId xmlns:p14="http://schemas.microsoft.com/office/powerpoint/2010/main" val="895464465"/>
+      </p:ext>
+    </p:extLst>
+  </p:cSld>
+  <p:clrMapOvr>
+    <a:masterClrMapping/>
+  </p:clrMapOvr>
+  <p:timing>
+    <p:tnLst>
+      <p:par>
+        <p:cTn id="1" dur="indefinite" restart="never" nodeType="tmRoot">
+          <p:childTnLst>
+            <p:seq>
+              <p:cTn id="2" nodeType="mainSeq"/>
+              <p:prevCondLst>
+                <p:cond evt="onPrev" delay="0">
+                  <p:tgtEl>
+                    <p:sldTgt/>
+                  </p:tgtEl>
+                </p:cond>
+              </p:prevCondLst>
+              <p:nextCondLst>
+                <p:cond evt="onNext" delay="0">
+                  <p:tgtEl>
+                    <p:sldTgt/>
+                  </p:tgtEl>
+                </p:cond>
+              </p:nextCondLst>
+            </p:seq>
+          </p:childTnLst>
+        </p:cTn>
+      </p:par>
+    </p:tnLst>
+  </p:timing>
+</p:sld>
+</file>
+
+<file path=ppt/slides/slide14.xml><?xml version="1.0" encoding="utf-8"?>
+<p:sld xmlns:a="http://schemas.openxmlformats.org/drawingml/2006/main" xmlns:r="http://schemas.openxmlformats.org/officeDocument/2006/relationships" xmlns:p="http://schemas.openxmlformats.org/presentationml/2006/main">
+  <p:cSld>
+    <p:spTree>
+      <p:nvGrpSpPr>
+        <p:cNvPr id="1" name=""/>
+        <p:cNvGrpSpPr/>
+        <p:nvPr/>
+      </p:nvGrpSpPr>
+      <p:grpSpPr>
+        <a:xfrm>
+          <a:off x="0" y="0"/>
+          <a:ext cx="0" cy="0"/>
+          <a:chOff x="0" y="0"/>
+          <a:chExt cx="0" cy="0"/>
+        </a:xfrm>
+      </p:grpSpPr>
+      <p:sp>
+        <p:nvSpPr>
+          <p:cNvPr id="84" name="CustomShape 1"/>
+          <p:cNvSpPr/>
+          <p:nvPr/>
+        </p:nvSpPr>
+        <p:spPr>
+          <a:xfrm>
+            <a:off x="214006" y="206584"/>
+            <a:ext cx="8784077" cy="1141920"/>
+          </a:xfrm>
+          <a:prstGeom prst="rect">
+            <a:avLst/>
+          </a:prstGeom>
+          <a:noFill/>
+          <a:ln>
+            <a:noFill/>
+          </a:ln>
+        </p:spPr>
+        <p:style>
+          <a:lnRef idx="0">
+            <a:scrgbClr r="0" g="0" b="0"/>
+          </a:lnRef>
+          <a:fillRef idx="0">
+            <a:scrgbClr r="0" g="0" b="0"/>
+          </a:fillRef>
+          <a:effectRef idx="0">
+            <a:scrgbClr r="0" g="0" b="0"/>
+          </a:effectRef>
+          <a:fontRef idx="minor"/>
+        </p:style>
+        <p:txBody>
+          <a:bodyPr lIns="90000" tIns="45000" rIns="90000" bIns="45000" anchor="ctr"/>
+          <a:lstStyle/>
+          <a:p>
+            <a:pPr algn="ctr">
+              <a:lnSpc>
+                <a:spcPct val="100000"/>
+              </a:lnSpc>
+            </a:pPr>
+            <a:r>
+              <a:rPr lang="pt-BR" sz="4400" b="0" strike="noStrike" spc="-1" dirty="0" smtClean="0">
+                <a:solidFill>
+                  <a:srgbClr val="000000"/>
+                </a:solidFill>
+                <a:uFill>
+                  <a:solidFill>
+                    <a:srgbClr val="FFFFFF"/>
+                  </a:solidFill>
+                </a:uFill>
+                <a:latin typeface="Calibri"/>
+                <a:ea typeface="DejaVu Sans"/>
+              </a:rPr>
+              <a:t>Visão de Alocação</a:t>
+            </a:r>
+          </a:p>
+        </p:txBody>
+      </p:sp>
+      <p:sp>
+        <p:nvSpPr>
+          <p:cNvPr id="85" name="CustomShape 2"/>
+          <p:cNvSpPr/>
+          <p:nvPr/>
+        </p:nvSpPr>
+        <p:spPr>
+          <a:xfrm>
+            <a:off x="457200" y="1600200"/>
+            <a:ext cx="8228520" cy="4524840"/>
+          </a:xfrm>
+          <a:prstGeom prst="rect">
+            <a:avLst/>
+          </a:prstGeom>
+          <a:noFill/>
+          <a:ln>
+            <a:noFill/>
+          </a:ln>
+        </p:spPr>
+        <p:style>
+          <a:lnRef idx="0">
+            <a:scrgbClr r="0" g="0" b="0"/>
+          </a:lnRef>
+          <a:fillRef idx="0">
+            <a:scrgbClr r="0" g="0" b="0"/>
+          </a:fillRef>
+          <a:effectRef idx="0">
+            <a:scrgbClr r="0" g="0" b="0"/>
+          </a:effectRef>
+          <a:fontRef idx="minor"/>
+        </p:style>
+        <p:txBody>
+          <a:bodyPr lIns="90000" tIns="45000" rIns="90000" bIns="45000"/>
+          <a:lstStyle/>
+          <a:p>
+            <a:pPr marL="1080">
+              <a:lnSpc>
+                <a:spcPct val="100000"/>
+              </a:lnSpc>
+              <a:buClr>
+                <a:srgbClr val="000000"/>
+              </a:buClr>
+            </a:pPr>
+            <a:endParaRPr lang="pt-BR" sz="1800" b="0" strike="noStrike" spc="-1" dirty="0">
+              <a:solidFill>
+                <a:srgbClr val="000000"/>
+              </a:solidFill>
+              <a:uFill>
+                <a:solidFill>
+                  <a:srgbClr val="FFFFFF"/>
+                </a:solidFill>
+              </a:uFill>
+              <a:latin typeface="Arial"/>
+            </a:endParaRPr>
+          </a:p>
+        </p:txBody>
+      </p:sp>
+      <p:pic>
+        <p:nvPicPr>
+          <p:cNvPr id="2" name="Imagem 1"/>
+          <p:cNvPicPr>
+            <a:picLocks noChangeAspect="1"/>
+          </p:cNvPicPr>
+          <p:nvPr/>
+        </p:nvPicPr>
+        <p:blipFill>
+          <a:blip r:embed="rId2">
+            <a:extLst>
+              <a:ext uri="{28A0092B-C50C-407E-A947-70E740481C1C}">
+                <a14:useLocalDpi xmlns:a14="http://schemas.microsoft.com/office/drawing/2010/main" val="0"/>
+              </a:ext>
+            </a:extLst>
+          </a:blip>
+          <a:stretch>
+            <a:fillRect/>
+          </a:stretch>
+        </p:blipFill>
+        <p:spPr>
+          <a:xfrm>
+            <a:off x="2371361" y="1167319"/>
+            <a:ext cx="4634154" cy="5587829"/>
+          </a:xfrm>
+          <a:prstGeom prst="rect">
+            <a:avLst/>
+          </a:prstGeom>
+        </p:spPr>
+      </p:pic>
     </p:spTree>
     <p:extLst>
       <p:ext uri="{BB962C8B-B14F-4D97-AF65-F5344CB8AC3E}">
@@ -3267,7 +3557,6 @@
               <a:rPr lang="en-US" dirty="0" smtClean="0"/>
               <a:t> 	</a:t>
             </a:r>
-            <a:endParaRPr lang="en-US" dirty="0" smtClean="0"/>
           </a:p>
           <a:p>
             <a:r>

</xml_diff>